<commit_message>
login , join , session check 기능 추가,vo mapping modify , email auth 추가 등등
</commit_message>
<xml_diff>
--- a/PLAN 테이블정의서.pptx
+++ b/PLAN 테이블정의서.pptx
@@ -8,7 +8,8 @@
     <p:sldId id="256" r:id="rId2"/>
     <p:sldId id="257" r:id="rId3"/>
     <p:sldId id="259" r:id="rId4"/>
-    <p:sldId id="258" r:id="rId5"/>
+    <p:sldId id="260" r:id="rId5"/>
+    <p:sldId id="258" r:id="rId6"/>
   </p:sldIdLst>
   <p:sldSz cx="12192000" cy="6858000"/>
   <p:notesSz cx="6858000" cy="9144000"/>
@@ -262,7 +263,7 @@
           <a:p>
             <a:fld id="{8721EFD5-5AB4-4C61-B5CE-625E676FA299}" type="datetimeFigureOut">
               <a:rPr lang="ko-KR" altLang="en-US" smtClean="0"/>
-              <a:t>2020-09-05</a:t>
+              <a:t>2020-09-08</a:t>
             </a:fld>
             <a:endParaRPr lang="ko-KR" altLang="en-US"/>
           </a:p>
@@ -460,7 +461,7 @@
           <a:p>
             <a:fld id="{8721EFD5-5AB4-4C61-B5CE-625E676FA299}" type="datetimeFigureOut">
               <a:rPr lang="ko-KR" altLang="en-US" smtClean="0"/>
-              <a:t>2020-09-05</a:t>
+              <a:t>2020-09-08</a:t>
             </a:fld>
             <a:endParaRPr lang="ko-KR" altLang="en-US"/>
           </a:p>
@@ -668,7 +669,7 @@
           <a:p>
             <a:fld id="{8721EFD5-5AB4-4C61-B5CE-625E676FA299}" type="datetimeFigureOut">
               <a:rPr lang="ko-KR" altLang="en-US" smtClean="0"/>
-              <a:t>2020-09-05</a:t>
+              <a:t>2020-09-08</a:t>
             </a:fld>
             <a:endParaRPr lang="ko-KR" altLang="en-US"/>
           </a:p>
@@ -866,7 +867,7 @@
           <a:p>
             <a:fld id="{8721EFD5-5AB4-4C61-B5CE-625E676FA299}" type="datetimeFigureOut">
               <a:rPr lang="ko-KR" altLang="en-US" smtClean="0"/>
-              <a:t>2020-09-05</a:t>
+              <a:t>2020-09-08</a:t>
             </a:fld>
             <a:endParaRPr lang="ko-KR" altLang="en-US"/>
           </a:p>
@@ -1141,7 +1142,7 @@
           <a:p>
             <a:fld id="{8721EFD5-5AB4-4C61-B5CE-625E676FA299}" type="datetimeFigureOut">
               <a:rPr lang="ko-KR" altLang="en-US" smtClean="0"/>
-              <a:t>2020-09-05</a:t>
+              <a:t>2020-09-08</a:t>
             </a:fld>
             <a:endParaRPr lang="ko-KR" altLang="en-US"/>
           </a:p>
@@ -1406,7 +1407,7 @@
           <a:p>
             <a:fld id="{8721EFD5-5AB4-4C61-B5CE-625E676FA299}" type="datetimeFigureOut">
               <a:rPr lang="ko-KR" altLang="en-US" smtClean="0"/>
-              <a:t>2020-09-05</a:t>
+              <a:t>2020-09-08</a:t>
             </a:fld>
             <a:endParaRPr lang="ko-KR" altLang="en-US"/>
           </a:p>
@@ -1818,7 +1819,7 @@
           <a:p>
             <a:fld id="{8721EFD5-5AB4-4C61-B5CE-625E676FA299}" type="datetimeFigureOut">
               <a:rPr lang="ko-KR" altLang="en-US" smtClean="0"/>
-              <a:t>2020-09-05</a:t>
+              <a:t>2020-09-08</a:t>
             </a:fld>
             <a:endParaRPr lang="ko-KR" altLang="en-US"/>
           </a:p>
@@ -1959,7 +1960,7 @@
           <a:p>
             <a:fld id="{8721EFD5-5AB4-4C61-B5CE-625E676FA299}" type="datetimeFigureOut">
               <a:rPr lang="ko-KR" altLang="en-US" smtClean="0"/>
-              <a:t>2020-09-05</a:t>
+              <a:t>2020-09-08</a:t>
             </a:fld>
             <a:endParaRPr lang="ko-KR" altLang="en-US"/>
           </a:p>
@@ -2072,7 +2073,7 @@
           <a:p>
             <a:fld id="{8721EFD5-5AB4-4C61-B5CE-625E676FA299}" type="datetimeFigureOut">
               <a:rPr lang="ko-KR" altLang="en-US" smtClean="0"/>
-              <a:t>2020-09-05</a:t>
+              <a:t>2020-09-08</a:t>
             </a:fld>
             <a:endParaRPr lang="ko-KR" altLang="en-US"/>
           </a:p>
@@ -2383,7 +2384,7 @@
           <a:p>
             <a:fld id="{8721EFD5-5AB4-4C61-B5CE-625E676FA299}" type="datetimeFigureOut">
               <a:rPr lang="ko-KR" altLang="en-US" smtClean="0"/>
-              <a:t>2020-09-05</a:t>
+              <a:t>2020-09-08</a:t>
             </a:fld>
             <a:endParaRPr lang="ko-KR" altLang="en-US"/>
           </a:p>
@@ -2671,7 +2672,7 @@
           <a:p>
             <a:fld id="{8721EFD5-5AB4-4C61-B5CE-625E676FA299}" type="datetimeFigureOut">
               <a:rPr lang="ko-KR" altLang="en-US" smtClean="0"/>
-              <a:t>2020-09-05</a:t>
+              <a:t>2020-09-08</a:t>
             </a:fld>
             <a:endParaRPr lang="ko-KR" altLang="en-US"/>
           </a:p>
@@ -2912,7 +2913,7 @@
           <a:p>
             <a:fld id="{8721EFD5-5AB4-4C61-B5CE-625E676FA299}" type="datetimeFigureOut">
               <a:rPr lang="ko-KR" altLang="en-US" smtClean="0"/>
-              <a:t>2020-09-05</a:t>
+              <a:t>2020-09-08</a:t>
             </a:fld>
             <a:endParaRPr lang="ko-KR" altLang="en-US"/>
           </a:p>
@@ -3344,14 +3345,14 @@
           <p:nvPr>
             <p:extLst>
               <p:ext uri="{D42A27DB-BD31-4B8C-83A1-F6EECF244321}">
-                <p14:modId xmlns:p14="http://schemas.microsoft.com/office/powerpoint/2010/main" val="3377043287"/>
+                <p14:modId xmlns:p14="http://schemas.microsoft.com/office/powerpoint/2010/main" val="2185441958"/>
               </p:ext>
             </p:extLst>
           </p:nvPr>
         </p:nvGraphicFramePr>
         <p:xfrm>
           <a:off x="932405" y="1443731"/>
-          <a:ext cx="10468658" cy="4054243"/>
+          <a:ext cx="10468658" cy="5192979"/>
         </p:xfrm>
         <a:graphic>
           <a:graphicData uri="http://schemas.openxmlformats.org/drawingml/2006/table">
@@ -3960,6 +3961,180 @@
                   </a:ext>
                 </a:extLst>
               </a:tr>
+              <a:tr h="569368">
+                <a:tc>
+                  <a:txBody>
+                    <a:bodyPr/>
+                    <a:lstStyle/>
+                    <a:p>
+                      <a:pPr marL="0" marR="0" lvl="0" indent="0" algn="l" defTabSz="914400" rtl="0" eaLnBrk="1" fontAlgn="auto" latinLnBrk="1" hangingPunct="1">
+                        <a:lnSpc>
+                          <a:spcPct val="100000"/>
+                        </a:lnSpc>
+                        <a:spcBef>
+                          <a:spcPts val="0"/>
+                        </a:spcBef>
+                        <a:spcAft>
+                          <a:spcPts val="0"/>
+                        </a:spcAft>
+                        <a:buClrTx/>
+                        <a:buSzTx/>
+                        <a:buFontTx/>
+                        <a:buNone/>
+                        <a:tabLst/>
+                        <a:defRPr/>
+                      </a:pPr>
+                      <a:r>
+                        <a:rPr lang="en-US" altLang="ko-KR" dirty="0"/>
+                        <a:t>USER_PRIVATEKEY</a:t>
+                      </a:r>
+                      <a:endParaRPr lang="ko-KR" altLang="en-US" dirty="0"/>
+                    </a:p>
+                  </a:txBody>
+                  <a:tcPr/>
+                </a:tc>
+                <a:tc>
+                  <a:txBody>
+                    <a:bodyPr/>
+                    <a:lstStyle/>
+                    <a:p>
+                      <a:pPr latinLnBrk="1"/>
+                      <a:r>
+                        <a:rPr lang="en-US" altLang="ko-KR" dirty="0"/>
+                        <a:t>VARCHAR(255)</a:t>
+                      </a:r>
+                      <a:endParaRPr lang="ko-KR" altLang="en-US" dirty="0"/>
+                    </a:p>
+                  </a:txBody>
+                  <a:tcPr/>
+                </a:tc>
+                <a:tc>
+                  <a:txBody>
+                    <a:bodyPr/>
+                    <a:lstStyle/>
+                    <a:p>
+                      <a:pPr latinLnBrk="1"/>
+                      <a:endParaRPr lang="ko-KR" altLang="en-US" dirty="0"/>
+                    </a:p>
+                  </a:txBody>
+                  <a:tcPr/>
+                </a:tc>
+                <a:tc>
+                  <a:txBody>
+                    <a:bodyPr/>
+                    <a:lstStyle/>
+                    <a:p>
+                      <a:pPr latinLnBrk="1"/>
+                      <a:r>
+                        <a:rPr lang="en-US" altLang="ko-KR" dirty="0"/>
+                        <a:t>N</a:t>
+                      </a:r>
+                      <a:endParaRPr lang="ko-KR" altLang="en-US" dirty="0"/>
+                    </a:p>
+                  </a:txBody>
+                  <a:tcPr/>
+                </a:tc>
+                <a:tc>
+                  <a:txBody>
+                    <a:bodyPr/>
+                    <a:lstStyle/>
+                    <a:p>
+                      <a:pPr latinLnBrk="1"/>
+                      <a:r>
+                        <a:rPr lang="ko-KR" altLang="en-US" dirty="0"/>
+                        <a:t>유저 이메일 인증 키</a:t>
+                      </a:r>
+                    </a:p>
+                  </a:txBody>
+                  <a:tcPr/>
+                </a:tc>
+                <a:extLst>
+                  <a:ext uri="{0D108BD9-81ED-4DB2-BD59-A6C34878D82A}">
+                    <a16:rowId xmlns:a16="http://schemas.microsoft.com/office/drawing/2014/main" val="589510879"/>
+                  </a:ext>
+                </a:extLst>
+              </a:tr>
+              <a:tr h="569368">
+                <a:tc>
+                  <a:txBody>
+                    <a:bodyPr/>
+                    <a:lstStyle/>
+                    <a:p>
+                      <a:pPr latinLnBrk="1"/>
+                      <a:r>
+                        <a:rPr lang="en-US" altLang="ko-KR" dirty="0"/>
+                        <a:t>USER_AUTH</a:t>
+                      </a:r>
+                      <a:endParaRPr lang="ko-KR" altLang="en-US" dirty="0"/>
+                    </a:p>
+                  </a:txBody>
+                  <a:tcPr/>
+                </a:tc>
+                <a:tc>
+                  <a:txBody>
+                    <a:bodyPr/>
+                    <a:lstStyle/>
+                    <a:p>
+                      <a:pPr latinLnBrk="1"/>
+                      <a:r>
+                        <a:rPr lang="en-US" altLang="ko-KR" dirty="0"/>
+                        <a:t>CHAR(1)</a:t>
+                      </a:r>
+                      <a:endParaRPr lang="ko-KR" altLang="en-US" dirty="0"/>
+                    </a:p>
+                  </a:txBody>
+                  <a:tcPr/>
+                </a:tc>
+                <a:tc>
+                  <a:txBody>
+                    <a:bodyPr/>
+                    <a:lstStyle/>
+                    <a:p>
+                      <a:pPr latinLnBrk="1"/>
+                      <a:endParaRPr lang="ko-KR" altLang="en-US" dirty="0"/>
+                    </a:p>
+                  </a:txBody>
+                  <a:tcPr/>
+                </a:tc>
+                <a:tc>
+                  <a:txBody>
+                    <a:bodyPr/>
+                    <a:lstStyle/>
+                    <a:p>
+                      <a:pPr latinLnBrk="1"/>
+                      <a:r>
+                        <a:rPr lang="en-US" altLang="ko-KR" dirty="0"/>
+                        <a:t>N</a:t>
+                      </a:r>
+                      <a:endParaRPr lang="ko-KR" altLang="en-US" dirty="0"/>
+                    </a:p>
+                  </a:txBody>
+                  <a:tcPr/>
+                </a:tc>
+                <a:tc>
+                  <a:txBody>
+                    <a:bodyPr/>
+                    <a:lstStyle/>
+                    <a:p>
+                      <a:pPr latinLnBrk="1"/>
+                      <a:r>
+                        <a:rPr lang="en-US" altLang="ko-KR" dirty="0"/>
+                        <a:t>DEFAULT N </a:t>
+                      </a:r>
+                      <a:r>
+                        <a:rPr lang="ko-KR" altLang="en-US" dirty="0"/>
+                        <a:t>유저 인증여부</a:t>
+                      </a:r>
+                    </a:p>
+                  </a:txBody>
+                  <a:tcPr/>
+                </a:tc>
+                <a:extLst>
+                  <a:ext uri="{0D108BD9-81ED-4DB2-BD59-A6C34878D82A}">
+                    <a16:rowId xmlns:a16="http://schemas.microsoft.com/office/drawing/2014/main" val="2398071626"/>
+                  </a:ext>
+                </a:extLst>
+              </a:tr>
             </a:tbl>
           </a:graphicData>
         </a:graphic>
@@ -4026,7 +4201,7 @@
         </p:nvSpPr>
         <p:spPr>
           <a:xfrm>
-            <a:off x="932405" y="5902526"/>
+            <a:off x="932404" y="964456"/>
             <a:ext cx="5741043" cy="369332"/>
           </a:xfrm>
           <a:prstGeom prst="rect">
@@ -6033,6 +6208,490 @@
 </file>
 
 <file path=ppt/slides/slide4.xml><?xml version="1.0" encoding="utf-8"?>
+<p:sld xmlns:a="http://schemas.openxmlformats.org/drawingml/2006/main" xmlns:r="http://schemas.openxmlformats.org/officeDocument/2006/relationships" xmlns:p="http://schemas.openxmlformats.org/presentationml/2006/main">
+  <p:cSld>
+    <p:spTree>
+      <p:nvGrpSpPr>
+        <p:cNvPr id="1" name=""/>
+        <p:cNvGrpSpPr/>
+        <p:nvPr/>
+      </p:nvGrpSpPr>
+      <p:grpSpPr>
+        <a:xfrm>
+          <a:off x="0" y="0"/>
+          <a:ext cx="0" cy="0"/>
+          <a:chOff x="0" y="0"/>
+          <a:chExt cx="0" cy="0"/>
+        </a:xfrm>
+      </p:grpSpPr>
+      <p:sp>
+        <p:nvSpPr>
+          <p:cNvPr id="4" name="TextBox 3">
+            <a:extLst>
+              <a:ext uri="{FF2B5EF4-FFF2-40B4-BE49-F238E27FC236}">
+                <a16:creationId xmlns:a16="http://schemas.microsoft.com/office/drawing/2014/main" id="{987F6E33-AE7B-434D-A9DC-194A6555B3A7}"/>
+              </a:ext>
+            </a:extLst>
+          </p:cNvPr>
+          <p:cNvSpPr txBox="1"/>
+          <p:nvPr/>
+        </p:nvSpPr>
+        <p:spPr>
+          <a:xfrm>
+            <a:off x="468132" y="670376"/>
+            <a:ext cx="5741043" cy="369332"/>
+          </a:xfrm>
+          <a:prstGeom prst="rect">
+            <a:avLst/>
+          </a:prstGeom>
+          <a:noFill/>
+        </p:spPr>
+        <p:txBody>
+          <a:bodyPr wrap="square" rtlCol="0">
+            <a:spAutoFit/>
+          </a:bodyPr>
+          <a:lstStyle/>
+          <a:p>
+            <a:r>
+              <a:rPr lang="en-US" altLang="ko-KR" dirty="0"/>
+              <a:t>KEY TABLE</a:t>
+            </a:r>
+          </a:p>
+        </p:txBody>
+      </p:sp>
+      <p:graphicFrame>
+        <p:nvGraphicFramePr>
+          <p:cNvPr id="5" name="표 8">
+            <a:extLst>
+              <a:ext uri="{FF2B5EF4-FFF2-40B4-BE49-F238E27FC236}">
+                <a16:creationId xmlns:a16="http://schemas.microsoft.com/office/drawing/2014/main" id="{95F1BDC7-2DE3-4699-A2CF-A787790DD519}"/>
+              </a:ext>
+            </a:extLst>
+          </p:cNvPr>
+          <p:cNvGraphicFramePr>
+            <a:graphicFrameLocks noGrp="1"/>
+          </p:cNvGraphicFramePr>
+          <p:nvPr>
+            <p:extLst>
+              <p:ext uri="{D42A27DB-BD31-4B8C-83A1-F6EECF244321}">
+                <p14:modId xmlns:p14="http://schemas.microsoft.com/office/powerpoint/2010/main" val="3621360681"/>
+              </p:ext>
+            </p:extLst>
+          </p:nvPr>
+        </p:nvGraphicFramePr>
+        <p:xfrm>
+          <a:off x="468132" y="1666754"/>
+          <a:ext cx="11100520" cy="1376680"/>
+        </p:xfrm>
+        <a:graphic>
+          <a:graphicData uri="http://schemas.openxmlformats.org/drawingml/2006/table">
+            <a:tbl>
+              <a:tblPr firstRow="1" bandRow="1">
+                <a:tableStyleId>{5C22544A-7EE6-4342-B048-85BDC9FD1C3A}</a:tableStyleId>
+              </a:tblPr>
+              <a:tblGrid>
+                <a:gridCol w="2752198">
+                  <a:extLst>
+                    <a:ext uri="{9D8B030D-6E8A-4147-A177-3AD203B41FA5}">
+                      <a16:colId xmlns:a16="http://schemas.microsoft.com/office/drawing/2014/main" val="4160034373"/>
+                    </a:ext>
+                  </a:extLst>
+                </a:gridCol>
+                <a:gridCol w="3219076">
+                  <a:extLst>
+                    <a:ext uri="{9D8B030D-6E8A-4147-A177-3AD203B41FA5}">
+                      <a16:colId xmlns:a16="http://schemas.microsoft.com/office/drawing/2014/main" val="3314443124"/>
+                    </a:ext>
+                  </a:extLst>
+                </a:gridCol>
+                <a:gridCol w="673418">
+                  <a:extLst>
+                    <a:ext uri="{9D8B030D-6E8A-4147-A177-3AD203B41FA5}">
+                      <a16:colId xmlns:a16="http://schemas.microsoft.com/office/drawing/2014/main" val="1919164067"/>
+                    </a:ext>
+                  </a:extLst>
+                </a:gridCol>
+                <a:gridCol w="1152843">
+                  <a:extLst>
+                    <a:ext uri="{9D8B030D-6E8A-4147-A177-3AD203B41FA5}">
+                      <a16:colId xmlns:a16="http://schemas.microsoft.com/office/drawing/2014/main" val="428159394"/>
+                    </a:ext>
+                  </a:extLst>
+                </a:gridCol>
+                <a:gridCol w="848043">
+                  <a:extLst>
+                    <a:ext uri="{9D8B030D-6E8A-4147-A177-3AD203B41FA5}">
+                      <a16:colId xmlns:a16="http://schemas.microsoft.com/office/drawing/2014/main" val="413800728"/>
+                    </a:ext>
+                  </a:extLst>
+                </a:gridCol>
+                <a:gridCol w="2454942">
+                  <a:extLst>
+                    <a:ext uri="{9D8B030D-6E8A-4147-A177-3AD203B41FA5}">
+                      <a16:colId xmlns:a16="http://schemas.microsoft.com/office/drawing/2014/main" val="2774665512"/>
+                    </a:ext>
+                  </a:extLst>
+                </a:gridCol>
+              </a:tblGrid>
+              <a:tr h="175389">
+                <a:tc>
+                  <a:txBody>
+                    <a:bodyPr/>
+                    <a:lstStyle/>
+                    <a:p>
+                      <a:pPr latinLnBrk="1"/>
+                      <a:r>
+                        <a:rPr lang="en-US" altLang="ko-KR" dirty="0"/>
+                        <a:t>NAME</a:t>
+                      </a:r>
+                      <a:endParaRPr lang="ko-KR" altLang="en-US" dirty="0"/>
+                    </a:p>
+                  </a:txBody>
+                  <a:tcPr/>
+                </a:tc>
+                <a:tc>
+                  <a:txBody>
+                    <a:bodyPr/>
+                    <a:lstStyle/>
+                    <a:p>
+                      <a:pPr latinLnBrk="1"/>
+                      <a:r>
+                        <a:rPr lang="en-US" altLang="ko-KR" dirty="0"/>
+                        <a:t>TYPE</a:t>
+                      </a:r>
+                      <a:endParaRPr lang="ko-KR" altLang="en-US" dirty="0"/>
+                    </a:p>
+                  </a:txBody>
+                  <a:tcPr/>
+                </a:tc>
+                <a:tc>
+                  <a:txBody>
+                    <a:bodyPr/>
+                    <a:lstStyle/>
+                    <a:p>
+                      <a:pPr latinLnBrk="1"/>
+                      <a:r>
+                        <a:rPr lang="en-US" altLang="ko-KR" dirty="0"/>
+                        <a:t>KEY</a:t>
+                      </a:r>
+                      <a:endParaRPr lang="ko-KR" altLang="en-US" dirty="0"/>
+                    </a:p>
+                  </a:txBody>
+                  <a:tcPr/>
+                </a:tc>
+                <a:tc>
+                  <a:txBody>
+                    <a:bodyPr/>
+                    <a:lstStyle/>
+                    <a:p>
+                      <a:pPr latinLnBrk="1"/>
+                      <a:r>
+                        <a:rPr lang="en-US" altLang="ko-KR" dirty="0"/>
+                        <a:t>UNIQUE</a:t>
+                      </a:r>
+                      <a:endParaRPr lang="ko-KR" altLang="en-US" dirty="0"/>
+                    </a:p>
+                  </a:txBody>
+                  <a:tcPr/>
+                </a:tc>
+                <a:tc>
+                  <a:txBody>
+                    <a:bodyPr/>
+                    <a:lstStyle/>
+                    <a:p>
+                      <a:pPr latinLnBrk="1"/>
+                      <a:r>
+                        <a:rPr lang="en-US" altLang="ko-KR" dirty="0"/>
+                        <a:t>NULL</a:t>
+                      </a:r>
+                      <a:endParaRPr lang="ko-KR" altLang="en-US" dirty="0"/>
+                    </a:p>
+                  </a:txBody>
+                  <a:tcPr/>
+                </a:tc>
+                <a:tc>
+                  <a:txBody>
+                    <a:bodyPr/>
+                    <a:lstStyle/>
+                    <a:p>
+                      <a:pPr latinLnBrk="1"/>
+                      <a:r>
+                        <a:rPr lang="en-US" altLang="ko-KR" dirty="0"/>
+                        <a:t>DESCRIPT</a:t>
+                      </a:r>
+                      <a:endParaRPr lang="ko-KR" altLang="en-US" dirty="0"/>
+                    </a:p>
+                  </a:txBody>
+                  <a:tcPr/>
+                </a:tc>
+                <a:extLst>
+                  <a:ext uri="{0D108BD9-81ED-4DB2-BD59-A6C34878D82A}">
+                    <a16:rowId xmlns:a16="http://schemas.microsoft.com/office/drawing/2014/main" val="964777172"/>
+                  </a:ext>
+                </a:extLst>
+              </a:tr>
+              <a:tr h="370840">
+                <a:tc>
+                  <a:txBody>
+                    <a:bodyPr/>
+                    <a:lstStyle/>
+                    <a:p>
+                      <a:pPr latinLnBrk="1"/>
+                      <a:r>
+                        <a:rPr lang="en-US" altLang="ko-KR" dirty="0"/>
+                        <a:t>KEY_SEQ</a:t>
+                      </a:r>
+                      <a:endParaRPr lang="ko-KR" altLang="en-US" dirty="0"/>
+                    </a:p>
+                  </a:txBody>
+                  <a:tcPr/>
+                </a:tc>
+                <a:tc>
+                  <a:txBody>
+                    <a:bodyPr/>
+                    <a:lstStyle/>
+                    <a:p>
+                      <a:pPr latinLnBrk="1"/>
+                      <a:r>
+                        <a:rPr lang="en-US" altLang="ko-KR" dirty="0"/>
+                        <a:t>MEDIUM INT</a:t>
+                      </a:r>
+                      <a:endParaRPr lang="ko-KR" altLang="en-US" dirty="0"/>
+                    </a:p>
+                  </a:txBody>
+                  <a:tcPr/>
+                </a:tc>
+                <a:tc>
+                  <a:txBody>
+                    <a:bodyPr/>
+                    <a:lstStyle/>
+                    <a:p>
+                      <a:pPr latinLnBrk="1"/>
+                      <a:r>
+                        <a:rPr lang="en-US" altLang="ko-KR" dirty="0"/>
+                        <a:t>PK</a:t>
+                      </a:r>
+                      <a:endParaRPr lang="ko-KR" altLang="en-US" dirty="0"/>
+                    </a:p>
+                  </a:txBody>
+                  <a:tcPr/>
+                </a:tc>
+                <a:tc>
+                  <a:txBody>
+                    <a:bodyPr/>
+                    <a:lstStyle/>
+                    <a:p>
+                      <a:pPr latinLnBrk="1"/>
+                      <a:r>
+                        <a:rPr lang="en-US" altLang="ko-KR" dirty="0"/>
+                        <a:t>Y</a:t>
+                      </a:r>
+                      <a:endParaRPr lang="ko-KR" altLang="en-US" dirty="0"/>
+                    </a:p>
+                  </a:txBody>
+                  <a:tcPr/>
+                </a:tc>
+                <a:tc>
+                  <a:txBody>
+                    <a:bodyPr/>
+                    <a:lstStyle/>
+                    <a:p>
+                      <a:pPr latinLnBrk="1"/>
+                      <a:r>
+                        <a:rPr lang="en-US" altLang="ko-KR" dirty="0"/>
+                        <a:t>N</a:t>
+                      </a:r>
+                      <a:endParaRPr lang="ko-KR" altLang="en-US" dirty="0"/>
+                    </a:p>
+                  </a:txBody>
+                  <a:tcPr/>
+                </a:tc>
+                <a:tc>
+                  <a:txBody>
+                    <a:bodyPr/>
+                    <a:lstStyle/>
+                    <a:p>
+                      <a:pPr latinLnBrk="1"/>
+                      <a:r>
+                        <a:rPr lang="ko-KR" altLang="en-US" dirty="0"/>
+                        <a:t>시퀀스</a:t>
+                      </a:r>
+                    </a:p>
+                  </a:txBody>
+                  <a:tcPr/>
+                </a:tc>
+                <a:extLst>
+                  <a:ext uri="{0D108BD9-81ED-4DB2-BD59-A6C34878D82A}">
+                    <a16:rowId xmlns:a16="http://schemas.microsoft.com/office/drawing/2014/main" val="3544269041"/>
+                  </a:ext>
+                </a:extLst>
+              </a:tr>
+              <a:tr h="370840">
+                <a:tc>
+                  <a:txBody>
+                    <a:bodyPr/>
+                    <a:lstStyle/>
+                    <a:p>
+                      <a:pPr latinLnBrk="1"/>
+                      <a:r>
+                        <a:rPr lang="en-US" altLang="ko-KR" dirty="0"/>
+                        <a:t>PRIVATEKEY_KEY</a:t>
+                      </a:r>
+                      <a:endParaRPr lang="ko-KR" altLang="en-US" dirty="0"/>
+                    </a:p>
+                  </a:txBody>
+                  <a:tcPr/>
+                </a:tc>
+                <a:tc>
+                  <a:txBody>
+                    <a:bodyPr/>
+                    <a:lstStyle/>
+                    <a:p>
+                      <a:pPr latinLnBrk="1"/>
+                      <a:r>
+                        <a:rPr lang="en-US" altLang="ko-KR" dirty="0"/>
+                        <a:t>VARCAHR(255)</a:t>
+                      </a:r>
+                      <a:endParaRPr lang="ko-KR" altLang="en-US" dirty="0"/>
+                    </a:p>
+                  </a:txBody>
+                  <a:tcPr/>
+                </a:tc>
+                <a:tc>
+                  <a:txBody>
+                    <a:bodyPr/>
+                    <a:lstStyle/>
+                    <a:p>
+                      <a:pPr latinLnBrk="1"/>
+                      <a:endParaRPr lang="ko-KR" altLang="en-US" dirty="0"/>
+                    </a:p>
+                  </a:txBody>
+                  <a:tcPr/>
+                </a:tc>
+                <a:tc>
+                  <a:txBody>
+                    <a:bodyPr/>
+                    <a:lstStyle/>
+                    <a:p>
+                      <a:pPr latinLnBrk="1"/>
+                      <a:r>
+                        <a:rPr lang="en-US" altLang="ko-KR" dirty="0"/>
+                        <a:t>Y</a:t>
+                      </a:r>
+                      <a:endParaRPr lang="ko-KR" altLang="en-US" dirty="0"/>
+                    </a:p>
+                  </a:txBody>
+                  <a:tcPr/>
+                </a:tc>
+                <a:tc>
+                  <a:txBody>
+                    <a:bodyPr/>
+                    <a:lstStyle/>
+                    <a:p>
+                      <a:pPr latinLnBrk="1"/>
+                      <a:r>
+                        <a:rPr lang="en-US" altLang="ko-KR" dirty="0"/>
+                        <a:t>N</a:t>
+                      </a:r>
+                      <a:endParaRPr lang="ko-KR" altLang="en-US" dirty="0"/>
+                    </a:p>
+                  </a:txBody>
+                  <a:tcPr/>
+                </a:tc>
+                <a:tc>
+                  <a:txBody>
+                    <a:bodyPr/>
+                    <a:lstStyle/>
+                    <a:p>
+                      <a:pPr latinLnBrk="1"/>
+                      <a:r>
+                        <a:rPr lang="en-US" altLang="ko-KR" dirty="0"/>
+                        <a:t>RSA SALT? SEED? </a:t>
+                      </a:r>
+                      <a:r>
+                        <a:rPr lang="ko-KR" altLang="en-US" dirty="0"/>
+                        <a:t>값 </a:t>
+                      </a:r>
+                      <a:r>
+                        <a:rPr lang="ko-KR" altLang="en-US" dirty="0" err="1"/>
+                        <a:t>컬럼명</a:t>
+                      </a:r>
+                      <a:r>
+                        <a:rPr lang="ko-KR" altLang="en-US" dirty="0"/>
+                        <a:t> 변경필요</a:t>
+                      </a:r>
+                    </a:p>
+                  </a:txBody>
+                  <a:tcPr/>
+                </a:tc>
+                <a:extLst>
+                  <a:ext uri="{0D108BD9-81ED-4DB2-BD59-A6C34878D82A}">
+                    <a16:rowId xmlns:a16="http://schemas.microsoft.com/office/drawing/2014/main" val="3132201085"/>
+                  </a:ext>
+                </a:extLst>
+              </a:tr>
+            </a:tbl>
+          </a:graphicData>
+        </a:graphic>
+      </p:graphicFrame>
+      <p:sp>
+        <p:nvSpPr>
+          <p:cNvPr id="6" name="TextBox 5">
+            <a:extLst>
+              <a:ext uri="{FF2B5EF4-FFF2-40B4-BE49-F238E27FC236}">
+                <a16:creationId xmlns:a16="http://schemas.microsoft.com/office/drawing/2014/main" id="{8A7E29B3-1161-4F53-BF84-BDFD5C406021}"/>
+              </a:ext>
+            </a:extLst>
+          </p:cNvPr>
+          <p:cNvSpPr txBox="1"/>
+          <p:nvPr/>
+        </p:nvSpPr>
+        <p:spPr>
+          <a:xfrm>
+            <a:off x="468132" y="4291516"/>
+            <a:ext cx="5741043" cy="369332"/>
+          </a:xfrm>
+          <a:prstGeom prst="rect">
+            <a:avLst/>
+          </a:prstGeom>
+          <a:noFill/>
+        </p:spPr>
+        <p:txBody>
+          <a:bodyPr wrap="square" rtlCol="0">
+            <a:spAutoFit/>
+          </a:bodyPr>
+          <a:lstStyle/>
+          <a:p>
+            <a:r>
+              <a:rPr lang="en-US" altLang="ko-KR" dirty="0"/>
+              <a:t>RSA </a:t>
+            </a:r>
+            <a:r>
+              <a:rPr lang="ko-KR" altLang="en-US" err="1"/>
+              <a:t>시드값</a:t>
+            </a:r>
+            <a:r>
+              <a:rPr lang="ko-KR" altLang="en-US"/>
+              <a:t> 테이블에서 넣어서 관리</a:t>
+            </a:r>
+            <a:endParaRPr lang="en-US" altLang="ko-KR" dirty="0"/>
+          </a:p>
+        </p:txBody>
+      </p:sp>
+    </p:spTree>
+    <p:extLst>
+      <p:ext uri="{BB962C8B-B14F-4D97-AF65-F5344CB8AC3E}">
+        <p14:creationId xmlns:p14="http://schemas.microsoft.com/office/powerpoint/2010/main" val="2172222515"/>
+      </p:ext>
+    </p:extLst>
+  </p:cSld>
+  <p:clrMapOvr>
+    <a:masterClrMapping/>
+  </p:clrMapOvr>
+</p:sld>
+</file>
+
+<file path=ppt/slides/slide5.xml><?xml version="1.0" encoding="utf-8"?>
 <p:sld xmlns:a="http://schemas.openxmlformats.org/drawingml/2006/main" xmlns:r="http://schemas.openxmlformats.org/officeDocument/2006/relationships" xmlns:p="http://schemas.openxmlformats.org/presentationml/2006/main">
   <p:cSld>
     <p:spTree>

</xml_diff>